<commit_message>
More updates on data analysis.
</commit_message>
<xml_diff>
--- a/images/duplo_completion.pptx
+++ b/images/duplo_completion.pptx
@@ -160,10 +160,12 @@
           </c:tx>
           <c:spPr>
             <a:solidFill>
-              <a:srgbClr val="009944"/>
+              <a:srgbClr val="70AD47"/>
             </a:solidFill>
-            <a:ln>
-              <a:noFill/>
+            <a:ln w="28575">
+              <a:solidFill>
+                <a:sysClr val="windowText" lastClr="000000"/>
+              </a:solidFill>
             </a:ln>
             <a:effectLst/>
           </c:spPr>
@@ -176,7 +178,7 @@
                   <a:bodyPr/>
                   <a:lstStyle/>
                   <a:p>
-                    <a:fld id="{E137455B-32E8-4EA2-A828-6968AFF66D07}" type="CELLRANGE">
+                    <a:fld id="{1BCF6401-268B-4A00-8273-5EAD49D01DEC}" type="CELLRANGE">
                       <a:rPr lang="en-US"/>
                       <a:pPr/>
                       <a:t>[CELLRANGE]</a:t>
@@ -210,7 +212,7 @@
                   <a:bodyPr/>
                   <a:lstStyle/>
                   <a:p>
-                    <a:fld id="{3D692370-C1C6-4B7A-9015-9603467DFCF3}" type="CELLRANGE">
+                    <a:fld id="{6B7D71AA-F717-4CCE-BC0B-9A887E4B8141}" type="CELLRANGE">
                       <a:rPr lang="en-US"/>
                       <a:pPr/>
                       <a:t>[CELLRANGE]</a:t>
@@ -244,7 +246,7 @@
                   <a:bodyPr/>
                   <a:lstStyle/>
                   <a:p>
-                    <a:fld id="{8D7B6AC4-B9BD-4393-95B0-30CDBE4EF287}" type="CELLRANGE">
+                    <a:fld id="{55BC05F4-0861-4B7E-89F8-DC2570A4DEE3}" type="CELLRANGE">
                       <a:rPr lang="en-US"/>
                       <a:pPr/>
                       <a:t>[CELLRANGE]</a:t>
@@ -273,12 +275,18 @@
             </c:dLbl>
             <c:dLbl>
               <c:idx val="3"/>
+              <c:layout>
+                <c:manualLayout>
+                  <c:x val="0"/>
+                  <c:y val="3.5353535353535352E-2"/>
+                </c:manualLayout>
+              </c:layout>
               <c:tx>
                 <c:rich>
                   <a:bodyPr/>
                   <a:lstStyle/>
                   <a:p>
-                    <a:fld id="{85F0311B-574A-4D6C-BA65-2CD232075F91}" type="CELLRANGE">
+                    <a:fld id="{4802F912-63F6-4386-A6B5-EC915BBBBD82}" type="CELLRANGE">
                       <a:rPr lang="en-US"/>
                       <a:pPr/>
                       <a:t>[CELLRANGE]</a:t>
@@ -297,7 +305,6 @@
               <c:extLst>
                 <c:ext xmlns:c15="http://schemas.microsoft.com/office/drawing/2012/chart" uri="{CE6537A1-D6FC-4f65-9D91-7224C49458BB}">
                   <c15:dlblFieldTable/>
-                  <c15:xForSave val="1"/>
                   <c15:showDataLabelsRange val="1"/>
                 </c:ext>
                 <c:ext xmlns:c16="http://schemas.microsoft.com/office/drawing/2014/chart" uri="{C3380CC4-5D6E-409C-BE32-E72D297353CC}">
@@ -307,12 +314,18 @@
             </c:dLbl>
             <c:dLbl>
               <c:idx val="4"/>
+              <c:layout>
+                <c:manualLayout>
+                  <c:x val="0"/>
+                  <c:y val="4.0404040404040407E-2"/>
+                </c:manualLayout>
+              </c:layout>
               <c:tx>
                 <c:rich>
                   <a:bodyPr/>
                   <a:lstStyle/>
                   <a:p>
-                    <a:fld id="{8BC9353D-C752-406E-8B29-970ECFF2D54B}" type="CELLRANGE">
+                    <a:fld id="{591CF7C7-DA10-4BC9-AB3A-96134F221A0E}" type="CELLRANGE">
                       <a:rPr lang="en-US"/>
                       <a:pPr/>
                       <a:t>[CELLRANGE]</a:t>
@@ -331,7 +344,6 @@
               <c:extLst>
                 <c:ext xmlns:c15="http://schemas.microsoft.com/office/drawing/2012/chart" uri="{CE6537A1-D6FC-4f65-9D91-7224C49458BB}">
                   <c15:dlblFieldTable/>
-                  <c15:xForSave val="1"/>
                   <c15:showDataLabelsRange val="1"/>
                 </c:ext>
                 <c:ext xmlns:c16="http://schemas.microsoft.com/office/drawing/2014/chart" uri="{C3380CC4-5D6E-409C-BE32-E72D297353CC}">
@@ -341,12 +353,18 @@
             </c:dLbl>
             <c:dLbl>
               <c:idx val="5"/>
+              <c:layout>
+                <c:manualLayout>
+                  <c:x val="0"/>
+                  <c:y val="4.0404040404040407E-2"/>
+                </c:manualLayout>
+              </c:layout>
               <c:tx>
                 <c:rich>
                   <a:bodyPr/>
                   <a:lstStyle/>
                   <a:p>
-                    <a:fld id="{0C1FE544-DE7B-4491-9BE1-568C7B04A2A0}" type="CELLRANGE">
+                    <a:fld id="{53FE7292-E9DE-4509-802E-6C0D425EFA72}" type="CELLRANGE">
                       <a:rPr lang="en-US"/>
                       <a:pPr/>
                       <a:t>[CELLRANGE]</a:t>
@@ -365,7 +383,6 @@
               <c:extLst>
                 <c:ext xmlns:c15="http://schemas.microsoft.com/office/drawing/2012/chart" uri="{CE6537A1-D6FC-4f65-9D91-7224C49458BB}">
                   <c15:dlblFieldTable/>
-                  <c15:xForSave val="1"/>
                   <c15:showDataLabelsRange val="1"/>
                 </c:ext>
                 <c:ext xmlns:c16="http://schemas.microsoft.com/office/drawing/2014/chart" uri="{C3380CC4-5D6E-409C-BE32-E72D297353CC}">
@@ -387,7 +404,7 @@
                 <a:pPr>
                   <a:defRPr sz="2800" b="0" i="0" u="none" strike="noStrike" kern="1200" baseline="0">
                     <a:solidFill>
-                      <a:schemeClr val="bg1"/>
+                      <a:schemeClr val="tx1"/>
                     </a:solidFill>
                     <a:latin typeface="+mn-lt"/>
                     <a:ea typeface="+mn-ea"/>
@@ -527,10 +544,12 @@
           </c:tx>
           <c:spPr>
             <a:solidFill>
-              <a:srgbClr val="C00000"/>
+              <a:srgbClr val="ED7D31"/>
             </a:solidFill>
-            <a:ln>
-              <a:noFill/>
+            <a:ln w="28575">
+              <a:solidFill>
+                <a:sysClr val="windowText" lastClr="000000"/>
+              </a:solidFill>
             </a:ln>
             <a:effectLst/>
           </c:spPr>
@@ -568,33 +587,7 @@
             </c:dLbl>
             <c:dLbl>
               <c:idx val="3"/>
-              <c:layout>
-                <c:manualLayout>
-                  <c:x val="-5.5551181102370356E-4"/>
-                  <c:y val="1.0606160025451365E-2"/>
-                </c:manualLayout>
-              </c:layout>
-              <c:tx>
-                <c:rich>
-                  <a:bodyPr/>
-                  <a:lstStyle/>
-                  <a:p>
-                    <a:fld id="{E0EAD319-61D8-40A5-B68E-7C99EDBCE57E}" type="CELLRANGE">
-                      <a:rPr lang="en-US" dirty="0"/>
-                      <a:pPr/>
-                      <a:t>[CELLRANGE]</a:t>
-                    </a:fld>
-                    <a:endParaRPr lang="en-US"/>
-                  </a:p>
-                </c:rich>
-              </c:tx>
-              <c:dLblPos val="ctr"/>
-              <c:showLegendKey val="0"/>
-              <c:showVal val="0"/>
-              <c:showCatName val="0"/>
-              <c:showSerName val="0"/>
-              <c:showPercent val="0"/>
-              <c:showBubbleSize val="0"/>
+              <c:delete val="1"/>
               <c:extLst>
                 <c:ext xmlns:c15="http://schemas.microsoft.com/office/drawing/2012/chart" uri="{CE6537A1-D6FC-4f65-9D91-7224C49458BB}">
                   <c15:layout>
@@ -603,8 +596,6 @@
                       <c:h val="9.3888888888888883E-2"/>
                     </c:manualLayout>
                   </c15:layout>
-                  <c15:dlblFieldTable/>
-                  <c15:showDataLabelsRange val="1"/>
                 </c:ext>
                 <c:ext xmlns:c16="http://schemas.microsoft.com/office/drawing/2014/chart" uri="{C3380CC4-5D6E-409C-BE32-E72D297353CC}">
                   <c16:uniqueId val="{00000016-C5FF-4992-BA52-6184E1D6256E}"/>
@@ -618,7 +609,7 @@
                   <a:bodyPr/>
                   <a:lstStyle/>
                   <a:p>
-                    <a:fld id="{C5F48167-E0A8-4F23-A6DF-11735B3448F0}" type="CELLRANGE">
+                    <a:fld id="{6225A411-6B6E-4E2E-9CA0-715D33133AB7}" type="CELLRANGE">
                       <a:rPr lang="en-US"/>
                       <a:pPr/>
                       <a:t>[CELLRANGE]</a:t>
@@ -652,7 +643,7 @@
                   <a:bodyPr/>
                   <a:lstStyle/>
                   <a:p>
-                    <a:fld id="{48A8D93D-52D7-4DEA-A34B-17D24043201F}" type="CELLRANGE">
+                    <a:fld id="{D679ECFC-38FB-49E6-9400-9C22AE7DF189}" type="CELLRANGE">
                       <a:rPr lang="en-US"/>
                       <a:pPr/>
                       <a:t>[CELLRANGE]</a:t>
@@ -693,7 +684,7 @@
                 <a:pPr>
                   <a:defRPr sz="2800" b="0" i="0" u="none" strike="noStrike" kern="1200" baseline="0">
                     <a:solidFill>
-                      <a:schemeClr val="bg1"/>
+                      <a:schemeClr val="tx1"/>
                     </a:solidFill>
                     <a:latin typeface="+mn-lt"/>
                     <a:ea typeface="+mn-ea"/>
@@ -1752,7 +1743,7 @@
           <a:p>
             <a:fld id="{BB9690E2-32B0-4B7F-88AC-28CD11FEDFE8}" type="datetimeFigureOut">
               <a:rPr lang="en-US" smtClean="0"/>
-              <a:t>2/15/2023</a:t>
+              <a:t>2/21/2023</a:t>
             </a:fld>
             <a:endParaRPr lang="en-US"/>
           </a:p>
@@ -1922,7 +1913,7 @@
           <a:p>
             <a:fld id="{BB9690E2-32B0-4B7F-88AC-28CD11FEDFE8}" type="datetimeFigureOut">
               <a:rPr lang="en-US" smtClean="0"/>
-              <a:t>2/15/2023</a:t>
+              <a:t>2/21/2023</a:t>
             </a:fld>
             <a:endParaRPr lang="en-US"/>
           </a:p>
@@ -2102,7 +2093,7 @@
           <a:p>
             <a:fld id="{BB9690E2-32B0-4B7F-88AC-28CD11FEDFE8}" type="datetimeFigureOut">
               <a:rPr lang="en-US" smtClean="0"/>
-              <a:t>2/15/2023</a:t>
+              <a:t>2/21/2023</a:t>
             </a:fld>
             <a:endParaRPr lang="en-US"/>
           </a:p>
@@ -2272,7 +2263,7 @@
           <a:p>
             <a:fld id="{BB9690E2-32B0-4B7F-88AC-28CD11FEDFE8}" type="datetimeFigureOut">
               <a:rPr lang="en-US" smtClean="0"/>
-              <a:t>2/15/2023</a:t>
+              <a:t>2/21/2023</a:t>
             </a:fld>
             <a:endParaRPr lang="en-US"/>
           </a:p>
@@ -2518,7 +2509,7 @@
           <a:p>
             <a:fld id="{BB9690E2-32B0-4B7F-88AC-28CD11FEDFE8}" type="datetimeFigureOut">
               <a:rPr lang="en-US" smtClean="0"/>
-              <a:t>2/15/2023</a:t>
+              <a:t>2/21/2023</a:t>
             </a:fld>
             <a:endParaRPr lang="en-US"/>
           </a:p>
@@ -2750,7 +2741,7 @@
           <a:p>
             <a:fld id="{BB9690E2-32B0-4B7F-88AC-28CD11FEDFE8}" type="datetimeFigureOut">
               <a:rPr lang="en-US" smtClean="0"/>
-              <a:t>2/15/2023</a:t>
+              <a:t>2/21/2023</a:t>
             </a:fld>
             <a:endParaRPr lang="en-US"/>
           </a:p>
@@ -3117,7 +3108,7 @@
           <a:p>
             <a:fld id="{BB9690E2-32B0-4B7F-88AC-28CD11FEDFE8}" type="datetimeFigureOut">
               <a:rPr lang="en-US" smtClean="0"/>
-              <a:t>2/15/2023</a:t>
+              <a:t>2/21/2023</a:t>
             </a:fld>
             <a:endParaRPr lang="en-US"/>
           </a:p>
@@ -3235,7 +3226,7 @@
           <a:p>
             <a:fld id="{BB9690E2-32B0-4B7F-88AC-28CD11FEDFE8}" type="datetimeFigureOut">
               <a:rPr lang="en-US" smtClean="0"/>
-              <a:t>2/15/2023</a:t>
+              <a:t>2/21/2023</a:t>
             </a:fld>
             <a:endParaRPr lang="en-US"/>
           </a:p>
@@ -3330,7 +3321,7 @@
           <a:p>
             <a:fld id="{BB9690E2-32B0-4B7F-88AC-28CD11FEDFE8}" type="datetimeFigureOut">
               <a:rPr lang="en-US" smtClean="0"/>
-              <a:t>2/15/2023</a:t>
+              <a:t>2/21/2023</a:t>
             </a:fld>
             <a:endParaRPr lang="en-US"/>
           </a:p>
@@ -3607,7 +3598,7 @@
           <a:p>
             <a:fld id="{BB9690E2-32B0-4B7F-88AC-28CD11FEDFE8}" type="datetimeFigureOut">
               <a:rPr lang="en-US" smtClean="0"/>
-              <a:t>2/15/2023</a:t>
+              <a:t>2/21/2023</a:t>
             </a:fld>
             <a:endParaRPr lang="en-US"/>
           </a:p>
@@ -3864,7 +3855,7 @@
           <a:p>
             <a:fld id="{BB9690E2-32B0-4B7F-88AC-28CD11FEDFE8}" type="datetimeFigureOut">
               <a:rPr lang="en-US" smtClean="0"/>
-              <a:t>2/15/2023</a:t>
+              <a:t>2/21/2023</a:t>
             </a:fld>
             <a:endParaRPr lang="en-US"/>
           </a:p>
@@ -4077,7 +4068,7 @@
           <a:p>
             <a:fld id="{BB9690E2-32B0-4B7F-88AC-28CD11FEDFE8}" type="datetimeFigureOut">
               <a:rPr lang="en-US" smtClean="0"/>
-              <a:t>2/15/2023</a:t>
+              <a:t>2/21/2023</a:t>
             </a:fld>
             <a:endParaRPr lang="en-US"/>
           </a:p>
@@ -4497,7 +4488,7 @@
           <p:nvPr>
             <p:extLst>
               <p:ext uri="{D42A27DB-BD31-4B8C-83A1-F6EECF244321}">
-                <p14:modId xmlns:p14="http://schemas.microsoft.com/office/powerpoint/2010/main" val="1508369817"/>
+                <p14:modId xmlns:p14="http://schemas.microsoft.com/office/powerpoint/2010/main" val="956926848"/>
               </p:ext>
             </p:extLst>
           </p:nvPr>

</xml_diff>